<commit_message>
Update IBM HR Analysis Presentation.pptx
</commit_message>
<xml_diff>
--- a/docs/IBM HR Analysis Presentation.pptx
+++ b/docs/IBM HR Analysis Presentation.pptx
@@ -232,7 +232,7 @@
           <a:p>
             <a:fld id="{AF397106-13C5-4EC6-97B4-95ACB90CD4AA}" type="datetimeFigureOut">
               <a:rPr lang="en-US" smtClean="0"/>
-              <a:t>5/17/2021</a:t>
+              <a:t>5/18/2021</a:t>
             </a:fld>
             <a:endParaRPr lang="en-US"/>
           </a:p>
@@ -410,7 +410,7 @@
           <a:p>
             <a:fld id="{91AC2643-D2C5-4000-AB14-34AA14C56356}" type="datetimeFigureOut">
               <a:rPr lang="en-US" smtClean="0"/>
-              <a:t>5/17/2021</a:t>
+              <a:t>5/18/2021</a:t>
             </a:fld>
             <a:endParaRPr lang="en-US"/>
           </a:p>
@@ -15562,288 +15562,12 @@
           <a:chExt cx="0" cy="0"/>
         </a:xfrm>
       </p:grpSpPr>
-      <p:sp>
-        <p:nvSpPr>
-          <p:cNvPr id="2" name="Title 1">
-            <a:extLst>
-              <a:ext uri="{FF2B5EF4-FFF2-40B4-BE49-F238E27FC236}">
-                <a16:creationId xmlns:a16="http://schemas.microsoft.com/office/drawing/2014/main" id="{5AA362C3-4282-4BEE-9AAF-FA1FE1C97AA3}"/>
-              </a:ext>
-            </a:extLst>
-          </p:cNvPr>
-          <p:cNvSpPr>
-            <a:spLocks noGrp="1"/>
-          </p:cNvSpPr>
-          <p:nvPr>
-            <p:ph type="title"/>
-          </p:nvPr>
-        </p:nvSpPr>
-        <p:spPr/>
-        <p:txBody>
-          <a:bodyPr/>
-          <a:lstStyle/>
-          <a:p>
-            <a:r>
-              <a:rPr lang="en-US" dirty="0"/>
-              <a:t>Deployment​ - Continued​</a:t>
-            </a:r>
-          </a:p>
-        </p:txBody>
-      </p:sp>
-      <p:sp>
-        <p:nvSpPr>
-          <p:cNvPr id="3" name="TextBox 2">
-            <a:extLst>
-              <a:ext uri="{FF2B5EF4-FFF2-40B4-BE49-F238E27FC236}">
-                <a16:creationId xmlns:a16="http://schemas.microsoft.com/office/drawing/2014/main" id="{DF5FD8A1-0AFE-4094-8066-B12C6E4C408F}"/>
-              </a:ext>
-            </a:extLst>
-          </p:cNvPr>
-          <p:cNvSpPr txBox="1"/>
-          <p:nvPr/>
-        </p:nvSpPr>
-        <p:spPr>
-          <a:xfrm>
-            <a:off x="7477126" y="1819259"/>
-            <a:ext cx="3599565" cy="1477328"/>
-          </a:xfrm>
-          <a:prstGeom prst="rect">
-            <a:avLst/>
-          </a:prstGeom>
-          <a:noFill/>
-        </p:spPr>
-        <p:txBody>
-          <a:bodyPr rot="0" spcFirstLastPara="0" vertOverflow="overflow" horzOverflow="overflow" vert="horz" wrap="square" lIns="91440" tIns="45720" rIns="91440" bIns="45720" numCol="1" spcCol="0" rtlCol="0" fromWordArt="0" anchor="t" anchorCtr="0" forceAA="0" compatLnSpc="1">
-            <a:prstTxWarp prst="textNoShape">
-              <a:avLst/>
-            </a:prstTxWarp>
-            <a:spAutoFit/>
-          </a:bodyPr>
-          <a:lstStyle/>
-          <a:p>
-            <a:r>
-              <a:rPr lang="en-US" b="1" dirty="0">
-                <a:latin typeface="Montserrat" panose="00000500000000000000" pitchFamily="2" charset="0"/>
-              </a:rPr>
-              <a:t>Important Variables:</a:t>
-            </a:r>
-          </a:p>
-          <a:p>
-            <a:pPr marL="342900" indent="-342900">
-              <a:buAutoNum type="arabicPeriod"/>
-            </a:pPr>
-            <a:r>
-              <a:rPr lang="en-US" dirty="0">
-                <a:latin typeface="Montserrat" panose="00000500000000000000" pitchFamily="2" charset="0"/>
-              </a:rPr>
-              <a:t>Overtime</a:t>
-            </a:r>
-          </a:p>
-          <a:p>
-            <a:pPr marL="342900" indent="-342900">
-              <a:buAutoNum type="arabicPeriod"/>
-            </a:pPr>
-            <a:r>
-              <a:rPr lang="en-US" dirty="0">
-                <a:latin typeface="Montserrat" panose="00000500000000000000" pitchFamily="2" charset="0"/>
-                <a:ea typeface="+mn-lt"/>
-                <a:cs typeface="+mn-lt"/>
-              </a:rPr>
-              <a:t>Monthly Income</a:t>
-            </a:r>
-          </a:p>
-          <a:p>
-            <a:pPr marL="342900" indent="-342900">
-              <a:buAutoNum type="arabicPeriod"/>
-            </a:pPr>
-            <a:r>
-              <a:rPr lang="en-US" dirty="0">
-                <a:solidFill>
-                  <a:schemeClr val="accent2"/>
-                </a:solidFill>
-                <a:latin typeface="Montserrat" panose="00000500000000000000" pitchFamily="2" charset="0"/>
-                <a:ea typeface="+mn-lt"/>
-                <a:cs typeface="+mn-lt"/>
-              </a:rPr>
-              <a:t>Age</a:t>
-            </a:r>
-          </a:p>
-          <a:p>
-            <a:pPr marL="342900" indent="-342900">
-              <a:buAutoNum type="arabicPeriod"/>
-            </a:pPr>
-            <a:r>
-              <a:rPr lang="en-US" dirty="0">
-                <a:solidFill>
-                  <a:schemeClr val="accent2"/>
-                </a:solidFill>
-                <a:latin typeface="Montserrat" panose="00000500000000000000" pitchFamily="2" charset="0"/>
-                <a:ea typeface="+mn-lt"/>
-                <a:cs typeface="+mn-lt"/>
-              </a:rPr>
-              <a:t>Total working years</a:t>
-            </a:r>
-            <a:endParaRPr lang="en-US" dirty="0">
-              <a:solidFill>
-                <a:schemeClr val="accent2"/>
-              </a:solidFill>
-              <a:latin typeface="Montserrat" panose="00000500000000000000" pitchFamily="2" charset="0"/>
-            </a:endParaRPr>
-          </a:p>
-        </p:txBody>
-      </p:sp>
-      <p:sp>
-        <p:nvSpPr>
-          <p:cNvPr id="4" name="TextBox 3">
-            <a:extLst>
-              <a:ext uri="{FF2B5EF4-FFF2-40B4-BE49-F238E27FC236}">
-                <a16:creationId xmlns:a16="http://schemas.microsoft.com/office/drawing/2014/main" id="{F3094990-71E9-4D07-9748-3E451172FECD}"/>
-              </a:ext>
-            </a:extLst>
-          </p:cNvPr>
-          <p:cNvSpPr txBox="1"/>
-          <p:nvPr/>
-        </p:nvSpPr>
-        <p:spPr>
-          <a:xfrm>
-            <a:off x="7477125" y="5771377"/>
-            <a:ext cx="3599565" cy="923330"/>
-          </a:xfrm>
-          <a:prstGeom prst="rect">
-            <a:avLst/>
-          </a:prstGeom>
-          <a:noFill/>
-        </p:spPr>
-        <p:txBody>
-          <a:bodyPr rot="0" spcFirstLastPara="0" vertOverflow="overflow" horzOverflow="overflow" vert="horz" wrap="square" lIns="91440" tIns="45720" rIns="91440" bIns="45720" numCol="1" spcCol="0" rtlCol="0" fromWordArt="0" anchor="t" anchorCtr="0" forceAA="0" compatLnSpc="1">
-            <a:prstTxWarp prst="textNoShape">
-              <a:avLst/>
-            </a:prstTxWarp>
-            <a:spAutoFit/>
-          </a:bodyPr>
-          <a:lstStyle/>
-          <a:p>
-            <a:r>
-              <a:rPr lang="en-US" b="1" dirty="0"/>
-              <a:t>Found:</a:t>
-            </a:r>
-            <a:r>
-              <a:rPr lang="en-US" dirty="0"/>
-              <a:t> Employees who are younger and have a shorter total working years are more likely to quit the job.</a:t>
-            </a:r>
-          </a:p>
-        </p:txBody>
-      </p:sp>
-      <p:sp>
-        <p:nvSpPr>
-          <p:cNvPr id="6" name="TextBox 5">
-            <a:extLst>
-              <a:ext uri="{FF2B5EF4-FFF2-40B4-BE49-F238E27FC236}">
-                <a16:creationId xmlns:a16="http://schemas.microsoft.com/office/drawing/2014/main" id="{14004C86-7E52-475E-8DCB-C0DDA25893F7}"/>
-              </a:ext>
-            </a:extLst>
-          </p:cNvPr>
-          <p:cNvSpPr txBox="1"/>
-          <p:nvPr/>
-        </p:nvSpPr>
-        <p:spPr>
-          <a:xfrm>
-            <a:off x="2073729" y="6048376"/>
-            <a:ext cx="2824841" cy="369332"/>
-          </a:xfrm>
-          <a:prstGeom prst="rect">
-            <a:avLst/>
-          </a:prstGeom>
-          <a:noFill/>
-        </p:spPr>
-        <p:txBody>
-          <a:bodyPr rot="0" spcFirstLastPara="0" vertOverflow="overflow" horzOverflow="overflow" vert="horz" wrap="square" lIns="91440" tIns="45720" rIns="91440" bIns="45720" numCol="1" spcCol="0" rtlCol="0" fromWordArt="0" anchor="t" anchorCtr="0" forceAA="0" compatLnSpc="1">
-            <a:prstTxWarp prst="textNoShape">
-              <a:avLst/>
-            </a:prstTxWarp>
-            <a:spAutoFit/>
-          </a:bodyPr>
-          <a:lstStyle/>
-          <a:p>
-            <a:pPr algn="ctr"/>
-            <a:r>
-              <a:rPr lang="en-US" b="1" dirty="0">
-                <a:latin typeface="Montserrat" panose="00000500000000000000" pitchFamily="2" charset="0"/>
-              </a:rPr>
-              <a:t>Age-Monthly Income</a:t>
-            </a:r>
-          </a:p>
-        </p:txBody>
-      </p:sp>
-      <p:sp>
-        <p:nvSpPr>
-          <p:cNvPr id="7" name="TextBox 6">
-            <a:extLst>
-              <a:ext uri="{FF2B5EF4-FFF2-40B4-BE49-F238E27FC236}">
-                <a16:creationId xmlns:a16="http://schemas.microsoft.com/office/drawing/2014/main" id="{4E3DD7F7-A226-4DB3-95A6-C088DA6D35EC}"/>
-              </a:ext>
-            </a:extLst>
-          </p:cNvPr>
-          <p:cNvSpPr txBox="1"/>
-          <p:nvPr/>
-        </p:nvSpPr>
-        <p:spPr>
-          <a:xfrm>
-            <a:off x="7477126" y="3561414"/>
-            <a:ext cx="4419599" cy="2031325"/>
-          </a:xfrm>
-          <a:prstGeom prst="rect">
-            <a:avLst/>
-          </a:prstGeom>
-          <a:noFill/>
-        </p:spPr>
-        <p:txBody>
-          <a:bodyPr rot="0" spcFirstLastPara="0" vertOverflow="overflow" horzOverflow="overflow" vert="horz" wrap="square" lIns="91440" tIns="45720" rIns="91440" bIns="45720" numCol="1" spcCol="0" rtlCol="0" fromWordArt="0" anchor="t" anchorCtr="0" forceAA="0" compatLnSpc="1">
-            <a:prstTxWarp prst="textNoShape">
-              <a:avLst/>
-            </a:prstTxWarp>
-            <a:spAutoFit/>
-          </a:bodyPr>
-          <a:lstStyle/>
-          <a:p>
-            <a:pPr marL="285750" indent="-285750">
-              <a:buFont typeface="Arial"/>
-              <a:buChar char="•"/>
-            </a:pPr>
-            <a:r>
-              <a:rPr lang="en-US" dirty="0">
-                <a:ea typeface="+mn-lt"/>
-                <a:cs typeface="+mn-lt"/>
-              </a:rPr>
-              <a:t>To ensure that employees form appropriate expectations.</a:t>
-            </a:r>
-            <a:endParaRPr lang="en-US" dirty="0"/>
-          </a:p>
-          <a:p>
-            <a:pPr marL="285750" indent="-285750">
-              <a:buFont typeface="Arial"/>
-              <a:buChar char="•"/>
-            </a:pPr>
-            <a:endParaRPr lang="en-US" dirty="0"/>
-          </a:p>
-          <a:p>
-            <a:pPr marL="285750" indent="-285750">
-              <a:buFont typeface="Arial"/>
-              <a:buChar char="•"/>
-            </a:pPr>
-            <a:r>
-              <a:rPr lang="en-US" dirty="0"/>
-              <a:t>Companies should provide employees with more realistic work information, including remuneration, working environment, conditions, etc.</a:t>
-            </a:r>
-          </a:p>
-        </p:txBody>
-      </p:sp>
       <p:pic>
         <p:nvPicPr>
-          <p:cNvPr id="9" name="Picture 8" descr="Graphical user interface, application&#10;&#10;Description automatically generated">
+          <p:cNvPr id="12" name="Picture 11" descr="Graphical user interface, application&#10;&#10;Description automatically generated">
             <a:extLst>
               <a:ext uri="{FF2B5EF4-FFF2-40B4-BE49-F238E27FC236}">
-                <a16:creationId xmlns:a16="http://schemas.microsoft.com/office/drawing/2014/main" id="{84A42837-340C-4263-A9EA-A83AA4FDD870}"/>
+                <a16:creationId xmlns:a16="http://schemas.microsoft.com/office/drawing/2014/main" id="{C5B671B1-614F-4D53-B0E5-958C38F0767A}"/>
               </a:ext>
             </a:extLst>
           </p:cNvPr>
@@ -15876,7 +15600,7 @@
         </p:blipFill>
         <p:spPr>
           <a:xfrm>
-            <a:off x="0" y="1690688"/>
+            <a:off x="0" y="1690689"/>
             <a:ext cx="6972301" cy="4357688"/>
           </a:xfrm>
           <a:prstGeom prst="rect">
@@ -15884,6 +15608,282 @@
           </a:prstGeom>
         </p:spPr>
       </p:pic>
+      <p:sp>
+        <p:nvSpPr>
+          <p:cNvPr id="2" name="Title 1">
+            <a:extLst>
+              <a:ext uri="{FF2B5EF4-FFF2-40B4-BE49-F238E27FC236}">
+                <a16:creationId xmlns:a16="http://schemas.microsoft.com/office/drawing/2014/main" id="{5AA362C3-4282-4BEE-9AAF-FA1FE1C97AA3}"/>
+              </a:ext>
+            </a:extLst>
+          </p:cNvPr>
+          <p:cNvSpPr>
+            <a:spLocks noGrp="1"/>
+          </p:cNvSpPr>
+          <p:nvPr>
+            <p:ph type="title"/>
+          </p:nvPr>
+        </p:nvSpPr>
+        <p:spPr/>
+        <p:txBody>
+          <a:bodyPr/>
+          <a:lstStyle/>
+          <a:p>
+            <a:r>
+              <a:rPr lang="en-US" dirty="0"/>
+              <a:t>Deployment​ - Continued​</a:t>
+            </a:r>
+          </a:p>
+        </p:txBody>
+      </p:sp>
+      <p:sp>
+        <p:nvSpPr>
+          <p:cNvPr id="3" name="TextBox 2">
+            <a:extLst>
+              <a:ext uri="{FF2B5EF4-FFF2-40B4-BE49-F238E27FC236}">
+                <a16:creationId xmlns:a16="http://schemas.microsoft.com/office/drawing/2014/main" id="{DF5FD8A1-0AFE-4094-8066-B12C6E4C408F}"/>
+              </a:ext>
+            </a:extLst>
+          </p:cNvPr>
+          <p:cNvSpPr txBox="1"/>
+          <p:nvPr/>
+        </p:nvSpPr>
+        <p:spPr>
+          <a:xfrm>
+            <a:off x="7477126" y="1819259"/>
+            <a:ext cx="3599565" cy="1477328"/>
+          </a:xfrm>
+          <a:prstGeom prst="rect">
+            <a:avLst/>
+          </a:prstGeom>
+          <a:noFill/>
+        </p:spPr>
+        <p:txBody>
+          <a:bodyPr rot="0" spcFirstLastPara="0" vertOverflow="overflow" horzOverflow="overflow" vert="horz" wrap="square" lIns="91440" tIns="45720" rIns="91440" bIns="45720" numCol="1" spcCol="0" rtlCol="0" fromWordArt="0" anchor="t" anchorCtr="0" forceAA="0" compatLnSpc="1">
+            <a:prstTxWarp prst="textNoShape">
+              <a:avLst/>
+            </a:prstTxWarp>
+            <a:spAutoFit/>
+          </a:bodyPr>
+          <a:lstStyle/>
+          <a:p>
+            <a:r>
+              <a:rPr lang="en-US" b="1" dirty="0">
+                <a:latin typeface="Montserrat" panose="00000500000000000000" pitchFamily="2" charset="0"/>
+              </a:rPr>
+              <a:t>Important Variables:</a:t>
+            </a:r>
+          </a:p>
+          <a:p>
+            <a:pPr marL="342900" indent="-342900">
+              <a:buAutoNum type="arabicPeriod"/>
+            </a:pPr>
+            <a:r>
+              <a:rPr lang="en-US" dirty="0">
+                <a:latin typeface="Montserrat" panose="00000500000000000000" pitchFamily="2" charset="0"/>
+              </a:rPr>
+              <a:t>Overtime</a:t>
+            </a:r>
+          </a:p>
+          <a:p>
+            <a:pPr marL="342900" indent="-342900">
+              <a:buAutoNum type="arabicPeriod"/>
+            </a:pPr>
+            <a:r>
+              <a:rPr lang="en-US" dirty="0">
+                <a:latin typeface="Montserrat" panose="00000500000000000000" pitchFamily="2" charset="0"/>
+                <a:ea typeface="+mn-lt"/>
+                <a:cs typeface="+mn-lt"/>
+              </a:rPr>
+              <a:t>Monthly Income</a:t>
+            </a:r>
+          </a:p>
+          <a:p>
+            <a:pPr marL="342900" indent="-342900">
+              <a:buAutoNum type="arabicPeriod"/>
+            </a:pPr>
+            <a:r>
+              <a:rPr lang="en-US" dirty="0">
+                <a:solidFill>
+                  <a:schemeClr val="accent2"/>
+                </a:solidFill>
+                <a:latin typeface="Montserrat" panose="00000500000000000000" pitchFamily="2" charset="0"/>
+                <a:ea typeface="+mn-lt"/>
+                <a:cs typeface="+mn-lt"/>
+              </a:rPr>
+              <a:t>Age</a:t>
+            </a:r>
+          </a:p>
+          <a:p>
+            <a:pPr marL="342900" indent="-342900">
+              <a:buAutoNum type="arabicPeriod"/>
+            </a:pPr>
+            <a:r>
+              <a:rPr lang="en-US" dirty="0">
+                <a:solidFill>
+                  <a:schemeClr val="accent2"/>
+                </a:solidFill>
+                <a:latin typeface="Montserrat" panose="00000500000000000000" pitchFamily="2" charset="0"/>
+                <a:ea typeface="+mn-lt"/>
+                <a:cs typeface="+mn-lt"/>
+              </a:rPr>
+              <a:t>Total working years</a:t>
+            </a:r>
+            <a:endParaRPr lang="en-US" dirty="0">
+              <a:solidFill>
+                <a:schemeClr val="accent2"/>
+              </a:solidFill>
+              <a:latin typeface="Montserrat" panose="00000500000000000000" pitchFamily="2" charset="0"/>
+            </a:endParaRPr>
+          </a:p>
+        </p:txBody>
+      </p:sp>
+      <p:sp>
+        <p:nvSpPr>
+          <p:cNvPr id="4" name="TextBox 3">
+            <a:extLst>
+              <a:ext uri="{FF2B5EF4-FFF2-40B4-BE49-F238E27FC236}">
+                <a16:creationId xmlns:a16="http://schemas.microsoft.com/office/drawing/2014/main" id="{F3094990-71E9-4D07-9748-3E451172FECD}"/>
+              </a:ext>
+            </a:extLst>
+          </p:cNvPr>
+          <p:cNvSpPr txBox="1"/>
+          <p:nvPr/>
+        </p:nvSpPr>
+        <p:spPr>
+          <a:xfrm>
+            <a:off x="7477125" y="5771377"/>
+            <a:ext cx="3599565" cy="923330"/>
+          </a:xfrm>
+          <a:prstGeom prst="rect">
+            <a:avLst/>
+          </a:prstGeom>
+          <a:noFill/>
+        </p:spPr>
+        <p:txBody>
+          <a:bodyPr rot="0" spcFirstLastPara="0" vertOverflow="overflow" horzOverflow="overflow" vert="horz" wrap="square" lIns="91440" tIns="45720" rIns="91440" bIns="45720" numCol="1" spcCol="0" rtlCol="0" fromWordArt="0" anchor="t" anchorCtr="0" forceAA="0" compatLnSpc="1">
+            <a:prstTxWarp prst="textNoShape">
+              <a:avLst/>
+            </a:prstTxWarp>
+            <a:spAutoFit/>
+          </a:bodyPr>
+          <a:lstStyle/>
+          <a:p>
+            <a:r>
+              <a:rPr lang="en-US" b="1" dirty="0"/>
+              <a:t>Found:</a:t>
+            </a:r>
+            <a:r>
+              <a:rPr lang="en-US" dirty="0"/>
+              <a:t> Employees who are younger and have a shorter total working years are more likely to quit the job.</a:t>
+            </a:r>
+          </a:p>
+        </p:txBody>
+      </p:sp>
+      <p:sp>
+        <p:nvSpPr>
+          <p:cNvPr id="6" name="TextBox 5">
+            <a:extLst>
+              <a:ext uri="{FF2B5EF4-FFF2-40B4-BE49-F238E27FC236}">
+                <a16:creationId xmlns:a16="http://schemas.microsoft.com/office/drawing/2014/main" id="{14004C86-7E52-475E-8DCB-C0DDA25893F7}"/>
+              </a:ext>
+            </a:extLst>
+          </p:cNvPr>
+          <p:cNvSpPr txBox="1"/>
+          <p:nvPr/>
+        </p:nvSpPr>
+        <p:spPr>
+          <a:xfrm>
+            <a:off x="2073729" y="6048376"/>
+            <a:ext cx="2824841" cy="369332"/>
+          </a:xfrm>
+          <a:prstGeom prst="rect">
+            <a:avLst/>
+          </a:prstGeom>
+          <a:noFill/>
+        </p:spPr>
+        <p:txBody>
+          <a:bodyPr rot="0" spcFirstLastPara="0" vertOverflow="overflow" horzOverflow="overflow" vert="horz" wrap="square" lIns="91440" tIns="45720" rIns="91440" bIns="45720" numCol="1" spcCol="0" rtlCol="0" fromWordArt="0" anchor="t" anchorCtr="0" forceAA="0" compatLnSpc="1">
+            <a:prstTxWarp prst="textNoShape">
+              <a:avLst/>
+            </a:prstTxWarp>
+            <a:spAutoFit/>
+          </a:bodyPr>
+          <a:lstStyle/>
+          <a:p>
+            <a:pPr algn="ctr"/>
+            <a:r>
+              <a:rPr lang="en-US" b="1" dirty="0">
+                <a:latin typeface="Montserrat" panose="00000500000000000000" pitchFamily="2" charset="0"/>
+              </a:rPr>
+              <a:t>Age-Monthly Income</a:t>
+            </a:r>
+          </a:p>
+        </p:txBody>
+      </p:sp>
+      <p:sp>
+        <p:nvSpPr>
+          <p:cNvPr id="7" name="TextBox 6">
+            <a:extLst>
+              <a:ext uri="{FF2B5EF4-FFF2-40B4-BE49-F238E27FC236}">
+                <a16:creationId xmlns:a16="http://schemas.microsoft.com/office/drawing/2014/main" id="{4E3DD7F7-A226-4DB3-95A6-C088DA6D35EC}"/>
+              </a:ext>
+            </a:extLst>
+          </p:cNvPr>
+          <p:cNvSpPr txBox="1"/>
+          <p:nvPr/>
+        </p:nvSpPr>
+        <p:spPr>
+          <a:xfrm>
+            <a:off x="7477126" y="3561414"/>
+            <a:ext cx="4419599" cy="2031325"/>
+          </a:xfrm>
+          <a:prstGeom prst="rect">
+            <a:avLst/>
+          </a:prstGeom>
+          <a:noFill/>
+        </p:spPr>
+        <p:txBody>
+          <a:bodyPr rot="0" spcFirstLastPara="0" vertOverflow="overflow" horzOverflow="overflow" vert="horz" wrap="square" lIns="91440" tIns="45720" rIns="91440" bIns="45720" numCol="1" spcCol="0" rtlCol="0" fromWordArt="0" anchor="t" anchorCtr="0" forceAA="0" compatLnSpc="1">
+            <a:prstTxWarp prst="textNoShape">
+              <a:avLst/>
+            </a:prstTxWarp>
+            <a:spAutoFit/>
+          </a:bodyPr>
+          <a:lstStyle/>
+          <a:p>
+            <a:pPr marL="285750" indent="-285750">
+              <a:buFont typeface="Arial"/>
+              <a:buChar char="•"/>
+            </a:pPr>
+            <a:r>
+              <a:rPr lang="en-US" dirty="0">
+                <a:ea typeface="+mn-lt"/>
+                <a:cs typeface="+mn-lt"/>
+              </a:rPr>
+              <a:t>To ensure that employees form appropriate expectations.</a:t>
+            </a:r>
+            <a:endParaRPr lang="en-US" dirty="0"/>
+          </a:p>
+          <a:p>
+            <a:pPr marL="285750" indent="-285750">
+              <a:buFont typeface="Arial"/>
+              <a:buChar char="•"/>
+            </a:pPr>
+            <a:endParaRPr lang="en-US" dirty="0"/>
+          </a:p>
+          <a:p>
+            <a:pPr marL="285750" indent="-285750">
+              <a:buFont typeface="Arial"/>
+              <a:buChar char="•"/>
+            </a:pPr>
+            <a:r>
+              <a:rPr lang="en-US" dirty="0"/>
+              <a:t>Companies should provide employees with more realistic work information, including remuneration, working environment, conditions, etc.</a:t>
+            </a:r>
+          </a:p>
+        </p:txBody>
+      </p:sp>
       <p:sp>
         <p:nvSpPr>
           <p:cNvPr id="5" name="Footer Placeholder 4">

</xml_diff>